<commit_message>
update 2021-06 discovery slides
including notes on discussion
</commit_message>
<xml_diff>
--- a/PRESENTATIONS/2021-06-online-f2f/2021-06-23-WoT-F2F-Discovery-McCool.pptx
+++ b/PRESENTATIONS/2021-06-online-f2f/2021-06-23-WoT-F2F-Discovery-McCool.pptx
@@ -5,7 +5,7 @@
     <p:sldMasterId id="2147483648" r:id="rId1"/>
   </p:sldMasterIdLst>
   <p:notesMasterIdLst>
-    <p:notesMasterId r:id="rId8"/>
+    <p:notesMasterId r:id="rId10"/>
   </p:notesMasterIdLst>
   <p:sldIdLst>
     <p:sldId id="256" r:id="rId2"/>
@@ -13,7 +13,9 @@
     <p:sldId id="258" r:id="rId4"/>
     <p:sldId id="261" r:id="rId5"/>
     <p:sldId id="259" r:id="rId6"/>
-    <p:sldId id="260" r:id="rId7"/>
+    <p:sldId id="262" r:id="rId7"/>
+    <p:sldId id="263" r:id="rId8"/>
+    <p:sldId id="260" r:id="rId9"/>
   </p:sldIdLst>
   <p:sldSz cx="12192000" cy="6858000"/>
   <p:notesSz cx="6858000" cy="9144000"/>
@@ -4497,6 +4499,12 @@
           <a:p>
             <a:r>
               <a:rPr lang="en-US" dirty="0"/>
+              <a:t>Embedded Metadata and Thing Types</a:t>
+            </a:r>
+          </a:p>
+          <a:p>
+            <a:r>
+              <a:rPr lang="en-US" dirty="0"/>
               <a:t>Open Issues</a:t>
             </a:r>
           </a:p>
@@ -5121,8 +5129,8 @@
         </p:nvSpPr>
         <p:spPr>
           <a:xfrm>
-            <a:off x="838200" y="1219200"/>
-            <a:ext cx="10515600" cy="4957763"/>
+            <a:off x="838200" y="1004712"/>
+            <a:ext cx="10515600" cy="5172252"/>
           </a:xfrm>
         </p:spPr>
         <p:txBody>
@@ -5135,6 +5143,13 @@
             </a:r>
           </a:p>
           <a:p>
+            <a:pPr lvl="1"/>
+            <a:r>
+              <a:rPr lang="en-US" dirty="0"/>
+              <a:t>inter-item vs. intra-item; applies to collections generally</a:t>
+            </a:r>
+          </a:p>
+          <a:p>
             <a:r>
               <a:rPr lang="en-US" dirty="0"/>
               <a:t>TD/TM appropriateness for describing Discovery API</a:t>
@@ -5144,7 +5159,7 @@
             <a:pPr lvl="1"/>
             <a:r>
               <a:rPr lang="en-US" dirty="0"/>
-              <a:t>When to use actions vs. properties</a:t>
+              <a:t>When to use actions vs. properties; relationship to "RESTful" APIs</a:t>
             </a:r>
           </a:p>
           <a:p>
@@ -5169,6 +5184,13 @@
             </a:r>
           </a:p>
           <a:p>
+            <a:pPr lvl="1"/>
+            <a:r>
+              <a:rPr lang="en-US" dirty="0"/>
+              <a:t>Event Subscription – all events</a:t>
+            </a:r>
+          </a:p>
+          <a:p>
             <a:r>
               <a:rPr lang="en-US" dirty="0"/>
               <a:t>RDF Framing and round-tripping</a:t>
@@ -5177,13 +5199,8 @@
           <a:p>
             <a:r>
               <a:rPr lang="en-US" dirty="0"/>
-              <a:t>Canonicalization and Signing (</a:t>
-            </a:r>
-            <a:r>
-              <a:rPr lang="en-US"/>
-              <a:t>pending addition to TDs...)</a:t>
-            </a:r>
-            <a:endParaRPr lang="en-US" dirty="0"/>
+              <a:t>Canonicalization and Signing (pending addition to TDs...)</a:t>
+            </a:r>
           </a:p>
           <a:p>
             <a:r>
@@ -5327,7 +5344,7 @@
           <p:cNvPr id="2" name="Title 1">
             <a:extLst>
               <a:ext uri="{FF2B5EF4-FFF2-40B4-BE49-F238E27FC236}">
-                <a16:creationId xmlns:a16="http://schemas.microsoft.com/office/drawing/2014/main" id="{CC8B4495-3EFE-1241-88E2-3563BE487100}"/>
+                <a16:creationId xmlns:a16="http://schemas.microsoft.com/office/drawing/2014/main" id="{C879D3F9-6656-7949-B6B7-FF13D1A18F21}"/>
               </a:ext>
             </a:extLst>
           </p:cNvPr>
@@ -5345,7 +5362,7 @@
           <a:p>
             <a:r>
               <a:rPr lang="en-US" dirty="0"/>
-              <a:t>Implementation and Testing Gaps</a:t>
+              <a:t>Discussion</a:t>
             </a:r>
           </a:p>
         </p:txBody>
@@ -5355,7 +5372,7 @@
           <p:cNvPr id="3" name="Content Placeholder 2">
             <a:extLst>
               <a:ext uri="{FF2B5EF4-FFF2-40B4-BE49-F238E27FC236}">
-                <a16:creationId xmlns:a16="http://schemas.microsoft.com/office/drawing/2014/main" id="{0C36118C-76C4-D34B-B76C-54D65E894FF3}"/>
+                <a16:creationId xmlns:a16="http://schemas.microsoft.com/office/drawing/2014/main" id="{13475678-BAA3-8A42-AE3D-59558711EA0A}"/>
               </a:ext>
             </a:extLst>
           </p:cNvPr>
@@ -5368,108 +5385,84 @@
         </p:nvSpPr>
         <p:spPr>
           <a:xfrm>
-            <a:off x="838200" y="1140178"/>
-            <a:ext cx="10515600" cy="5036785"/>
-          </a:xfrm>
-        </p:spPr>
-        <p:txBody>
-          <a:bodyPr/>
-          <a:lstStyle/>
-          <a:p>
-            <a:r>
-              <a:rPr lang="en-US" dirty="0"/>
-              <a:t>Elements that Need Testing</a:t>
+            <a:off x="838200" y="1128890"/>
+            <a:ext cx="10515600" cy="5048074"/>
+          </a:xfrm>
+        </p:spPr>
+        <p:txBody>
+          <a:bodyPr/>
+          <a:lstStyle/>
+          <a:p>
+            <a:r>
+              <a:rPr lang="en-US" dirty="0"/>
+              <a:t>Collections</a:t>
             </a:r>
           </a:p>
           <a:p>
             <a:pPr lvl="1"/>
             <a:r>
               <a:rPr lang="en-US" dirty="0"/>
-              <a:t>Introductions: DNS-SD, DID, </a:t>
-            </a:r>
-            <a:r>
-              <a:rPr lang="en-US" dirty="0" err="1"/>
-              <a:t>CoRE</a:t>
-            </a:r>
-            <a:r>
-              <a:rPr lang="en-US" dirty="0"/>
-              <a:t> RD</a:t>
+              <a:t>Applies to other IoT things – e.g. Timers, Data records, Batch sensors, etc.</a:t>
             </a:r>
           </a:p>
           <a:p>
             <a:pPr lvl="1"/>
             <a:r>
               <a:rPr lang="en-US" dirty="0"/>
-              <a:t>Explorations</a:t>
-            </a:r>
-          </a:p>
-          <a:p>
-            <a:pPr lvl="2"/>
-            <a:r>
-              <a:rPr lang="en-US" dirty="0"/>
-              <a:t>Self-Description</a:t>
-            </a:r>
-          </a:p>
-          <a:p>
-            <a:pPr lvl="2"/>
-            <a:r>
-              <a:rPr lang="en-US" dirty="0"/>
-              <a:t>Directory Service</a:t>
-            </a:r>
-          </a:p>
-          <a:p>
-            <a:r>
-              <a:rPr lang="en-US" dirty="0"/>
-              <a:t>Directory Service</a:t>
+              <a:t>Pagination is generally needed for collections</a:t>
             </a:r>
           </a:p>
           <a:p>
             <a:pPr lvl="1"/>
             <a:r>
               <a:rPr lang="en-US" dirty="0"/>
-              <a:t>Largest part of the specification</a:t>
+              <a:t>An "op" on properties to get a subset?</a:t>
+            </a:r>
+          </a:p>
+          <a:p>
+            <a:r>
+              <a:rPr lang="en-US" dirty="0"/>
+              <a:t>Protocol dependence</a:t>
             </a:r>
           </a:p>
           <a:p>
             <a:pPr lvl="1"/>
             <a:r>
               <a:rPr lang="en-US" dirty="0"/>
-              <a:t>Two separate implementations in progress</a:t>
+              <a:t>Efficiency vs. orthogonality</a:t>
+            </a:r>
+          </a:p>
+          <a:p>
+            <a:r>
+              <a:rPr lang="en-US" dirty="0"/>
+              <a:t>PATCH</a:t>
             </a:r>
           </a:p>
           <a:p>
             <a:pPr lvl="1"/>
             <a:r>
               <a:rPr lang="en-US" dirty="0"/>
-              <a:t>Start on a test suite, tool integration</a:t>
+              <a:t>Actually reduces load on SMALL devices</a:t>
             </a:r>
           </a:p>
           <a:p>
             <a:pPr lvl="1"/>
             <a:r>
               <a:rPr lang="en-US" dirty="0"/>
-              <a:t>Gaps/challenges:</a:t>
-            </a:r>
-          </a:p>
-          <a:p>
-            <a:pPr lvl="2"/>
-            <a:r>
-              <a:rPr lang="en-US" dirty="0"/>
-              <a:t>Only one committed to (the optional...) SPARQL implementation</a:t>
-            </a:r>
-          </a:p>
-          <a:p>
-            <a:pPr lvl="2"/>
-            <a:r>
-              <a:rPr lang="en-US" dirty="0"/>
-              <a:t>Query mechanisms (e.g. JSON Path) very "large" – how to validate?</a:t>
-            </a:r>
-          </a:p>
-          <a:p>
-            <a:pPr lvl="2"/>
-            <a:r>
-              <a:rPr lang="en-US" dirty="0"/>
-              <a:t>JSON Path specification still in draft (with IETF)</a:t>
+              <a:t>Useful for other things, i.e. dynamic geolocation data in a TD</a:t>
+            </a:r>
+          </a:p>
+          <a:p>
+            <a:r>
+              <a:rPr lang="en-US" dirty="0"/>
+              <a:t>Events</a:t>
+            </a:r>
+          </a:p>
+          <a:p>
+            <a:pPr lvl="1"/>
+            <a:r>
+              <a:rPr lang="en-US" dirty="0"/>
+              <a:t>SSE limit in browsers; subscribe-to-all useful op</a:t>
             </a:r>
           </a:p>
           <a:p>
@@ -5483,7 +5476,7 @@
           <p:cNvPr id="4" name="Footer Placeholder 3">
             <a:extLst>
               <a:ext uri="{FF2B5EF4-FFF2-40B4-BE49-F238E27FC236}">
-                <a16:creationId xmlns:a16="http://schemas.microsoft.com/office/drawing/2014/main" id="{2B1133AD-AB37-7F4D-BF26-CAB33FFCF377}"/>
+                <a16:creationId xmlns:a16="http://schemas.microsoft.com/office/drawing/2014/main" id="{1232853D-E097-9345-8A57-B1C7B911D601}"/>
               </a:ext>
             </a:extLst>
           </p:cNvPr>
@@ -5511,7 +5504,7 @@
           <p:cNvPr id="5" name="Slide Number Placeholder 4">
             <a:extLst>
               <a:ext uri="{FF2B5EF4-FFF2-40B4-BE49-F238E27FC236}">
-                <a16:creationId xmlns:a16="http://schemas.microsoft.com/office/drawing/2014/main" id="{3A1FA4E0-3836-C544-8AD9-35975EA62884}"/>
+                <a16:creationId xmlns:a16="http://schemas.microsoft.com/office/drawing/2014/main" id="{0CB6EFD5-3C93-1145-BB76-4FF0EEAAD816}"/>
               </a:ext>
             </a:extLst>
           </p:cNvPr>
@@ -5530,6 +5523,591 @@
             <a:fld id="{055BDE2E-7167-1944-9FEE-E44668D91CB6}" type="slidenum">
               <a:rPr lang="en-US" smtClean="0"/>
               <a:t>6</a:t>
+            </a:fld>
+            <a:endParaRPr lang="en-US"/>
+          </a:p>
+        </p:txBody>
+      </p:sp>
+      <p:sp>
+        <p:nvSpPr>
+          <p:cNvPr id="6" name="Date Placeholder 5">
+            <a:extLst>
+              <a:ext uri="{FF2B5EF4-FFF2-40B4-BE49-F238E27FC236}">
+                <a16:creationId xmlns:a16="http://schemas.microsoft.com/office/drawing/2014/main" id="{7281F8CD-5B7B-6949-BDB6-D1B12E18645C}"/>
+              </a:ext>
+            </a:extLst>
+          </p:cNvPr>
+          <p:cNvSpPr>
+            <a:spLocks noGrp="1"/>
+          </p:cNvSpPr>
+          <p:nvPr>
+            <p:ph type="dt" sz="half" idx="10"/>
+          </p:nvPr>
+        </p:nvSpPr>
+        <p:spPr/>
+        <p:txBody>
+          <a:bodyPr/>
+          <a:lstStyle/>
+          <a:p>
+            <a:fld id="{B929AB1E-7FD9-0A40-B7C0-508CCACB3E9A}" type="datetime1">
+              <a:rPr lang="en-CA" smtClean="0"/>
+              <a:t>2021-06-23</a:t>
+            </a:fld>
+            <a:endParaRPr lang="en-US"/>
+          </a:p>
+        </p:txBody>
+      </p:sp>
+    </p:spTree>
+    <p:extLst>
+      <p:ext uri="{BB962C8B-B14F-4D97-AF65-F5344CB8AC3E}">
+        <p14:creationId xmlns:p14="http://schemas.microsoft.com/office/powerpoint/2010/main" val="1996556731"/>
+      </p:ext>
+    </p:extLst>
+  </p:cSld>
+  <p:clrMapOvr>
+    <a:masterClrMapping/>
+  </p:clrMapOvr>
+</p:sld>
+</file>
+
+<file path=ppt/slides/slide7.xml><?xml version="1.0" encoding="utf-8"?>
+<p:sld xmlns:a="http://schemas.openxmlformats.org/drawingml/2006/main" xmlns:r="http://schemas.openxmlformats.org/officeDocument/2006/relationships" xmlns:p="http://schemas.openxmlformats.org/presentationml/2006/main">
+  <p:cSld>
+    <p:spTree>
+      <p:nvGrpSpPr>
+        <p:cNvPr id="1" name=""/>
+        <p:cNvGrpSpPr/>
+        <p:nvPr/>
+      </p:nvGrpSpPr>
+      <p:grpSpPr>
+        <a:xfrm>
+          <a:off x="0" y="0"/>
+          <a:ext cx="0" cy="0"/>
+          <a:chOff x="0" y="0"/>
+          <a:chExt cx="0" cy="0"/>
+        </a:xfrm>
+      </p:grpSpPr>
+      <p:sp>
+        <p:nvSpPr>
+          <p:cNvPr id="2" name="Title 1">
+            <a:extLst>
+              <a:ext uri="{FF2B5EF4-FFF2-40B4-BE49-F238E27FC236}">
+                <a16:creationId xmlns:a16="http://schemas.microsoft.com/office/drawing/2014/main" id="{A4D2A5CA-D767-3345-B43D-A3509DE89D98}"/>
+              </a:ext>
+            </a:extLst>
+          </p:cNvPr>
+          <p:cNvSpPr>
+            <a:spLocks noGrp="1"/>
+          </p:cNvSpPr>
+          <p:nvPr>
+            <p:ph type="title"/>
+          </p:nvPr>
+        </p:nvSpPr>
+        <p:spPr/>
+        <p:txBody>
+          <a:bodyPr/>
+          <a:lstStyle/>
+          <a:p>
+            <a:r>
+              <a:rPr lang="en-US" dirty="0"/>
+              <a:t>Discussion 2</a:t>
+            </a:r>
+          </a:p>
+        </p:txBody>
+      </p:sp>
+      <p:sp>
+        <p:nvSpPr>
+          <p:cNvPr id="3" name="Content Placeholder 2">
+            <a:extLst>
+              <a:ext uri="{FF2B5EF4-FFF2-40B4-BE49-F238E27FC236}">
+                <a16:creationId xmlns:a16="http://schemas.microsoft.com/office/drawing/2014/main" id="{89BD7216-31D5-9148-96EA-0F206117E2E6}"/>
+              </a:ext>
+            </a:extLst>
+          </p:cNvPr>
+          <p:cNvSpPr>
+            <a:spLocks noGrp="1"/>
+          </p:cNvSpPr>
+          <p:nvPr>
+            <p:ph idx="1"/>
+          </p:nvPr>
+        </p:nvSpPr>
+        <p:spPr/>
+        <p:txBody>
+          <a:bodyPr/>
+          <a:lstStyle/>
+          <a:p>
+            <a:r>
+              <a:rPr lang="en-US" dirty="0"/>
+              <a:t>Profiles vs. Directory</a:t>
+            </a:r>
+          </a:p>
+          <a:p>
+            <a:pPr lvl="1"/>
+            <a:r>
+              <a:rPr lang="en-US" dirty="0"/>
+              <a:t>Directory not following core profile – and that's ok, it's "its own profile"</a:t>
+            </a:r>
+          </a:p>
+          <a:p>
+            <a:r>
+              <a:rPr lang="en-US" dirty="0"/>
+              <a:t>Ontologies</a:t>
+            </a:r>
+          </a:p>
+          <a:p>
+            <a:pPr lvl="1"/>
+            <a:r>
+              <a:rPr lang="en-US" dirty="0"/>
+              <a:t>Use cases for </a:t>
+            </a:r>
+            <a:r>
+              <a:rPr lang="en-US" dirty="0" err="1"/>
+              <a:t>ThingLink</a:t>
+            </a:r>
+            <a:r>
+              <a:rPr lang="en-US" dirty="0"/>
+              <a:t> </a:t>
+            </a:r>
+            <a:r>
+              <a:rPr lang="en-US" dirty="0">
+                <a:sym typeface="Wingdings" pitchFamily="2" charset="2"/>
+              </a:rPr>
+              <a:t> argues to move/reference these into/from the TD ontology (e.g. similar to wot-security)</a:t>
+            </a:r>
+          </a:p>
+          <a:p>
+            <a:pPr lvl="1"/>
+            <a:r>
+              <a:rPr lang="en-US" dirty="0">
+                <a:sym typeface="Wingdings" pitchFamily="2" charset="2"/>
+              </a:rPr>
+              <a:t>May also want to move </a:t>
+            </a:r>
+            <a:r>
+              <a:rPr lang="en-US" dirty="0" err="1">
+                <a:sym typeface="Wingdings" pitchFamily="2" charset="2"/>
+              </a:rPr>
+              <a:t>registrationInfo</a:t>
+            </a:r>
+            <a:r>
+              <a:rPr lang="en-US" dirty="0">
+                <a:sym typeface="Wingdings" pitchFamily="2" charset="2"/>
+              </a:rPr>
+              <a:t>, </a:t>
+            </a:r>
+            <a:r>
+              <a:rPr lang="en-US" dirty="0" err="1">
+                <a:sym typeface="Wingdings" pitchFamily="2" charset="2"/>
+              </a:rPr>
+              <a:t>ThingDirectory</a:t>
+            </a:r>
+            <a:endParaRPr lang="en-US" dirty="0">
+              <a:sym typeface="Wingdings" pitchFamily="2" charset="2"/>
+            </a:endParaRPr>
+          </a:p>
+          <a:p>
+            <a:r>
+              <a:rPr lang="en-US" dirty="0">
+                <a:sym typeface="Wingdings" pitchFamily="2" charset="2"/>
+              </a:rPr>
+              <a:t>Relationship of TM and </a:t>
+            </a:r>
+            <a:r>
+              <a:rPr lang="en-US" dirty="0" err="1">
+                <a:sym typeface="Wingdings" pitchFamily="2" charset="2"/>
+              </a:rPr>
+              <a:t>ThingLink</a:t>
+            </a:r>
+            <a:r>
+              <a:rPr lang="en-US" dirty="0">
+                <a:sym typeface="Wingdings" pitchFamily="2" charset="2"/>
+              </a:rPr>
+              <a:t> to be clarified/aligned</a:t>
+            </a:r>
+          </a:p>
+          <a:p>
+            <a:pPr lvl="1"/>
+            <a:r>
+              <a:rPr lang="en-US" dirty="0">
+                <a:sym typeface="Wingdings" pitchFamily="2" charset="2"/>
+              </a:rPr>
+              <a:t>Look at use cases, related to TD/TM use cases</a:t>
+            </a:r>
+          </a:p>
+          <a:p>
+            <a:r>
+              <a:rPr lang="en-US" dirty="0">
+                <a:sym typeface="Wingdings" pitchFamily="2" charset="2"/>
+              </a:rPr>
+              <a:t>SPARQL/RDF Round-tripping</a:t>
+            </a:r>
+          </a:p>
+          <a:p>
+            <a:pPr lvl="1"/>
+            <a:r>
+              <a:rPr lang="en-US" dirty="0">
+                <a:sym typeface="Wingdings" pitchFamily="2" charset="2"/>
+              </a:rPr>
+              <a:t>JSON-LD Framing needed... or not?</a:t>
+            </a:r>
+          </a:p>
+          <a:p>
+            <a:pPr lvl="1"/>
+            <a:r>
+              <a:rPr lang="en-US" dirty="0">
+                <a:sym typeface="Wingdings" pitchFamily="2" charset="2"/>
+              </a:rPr>
+              <a:t>What use cases need a valid TD returned from a SPARQL query?</a:t>
+            </a:r>
+          </a:p>
+          <a:p>
+            <a:pPr lvl="2"/>
+            <a:r>
+              <a:rPr lang="en-US" dirty="0">
+                <a:sym typeface="Wingdings" pitchFamily="2" charset="2"/>
+              </a:rPr>
+              <a:t>Can use SPARQL -&gt; get ids -&gt; get TDs from id using </a:t>
+            </a:r>
+            <a:r>
+              <a:rPr lang="en-US" dirty="0" err="1">
+                <a:sym typeface="Wingdings" pitchFamily="2" charset="2"/>
+              </a:rPr>
+              <a:t>retrieveThing</a:t>
+            </a:r>
+            <a:r>
+              <a:rPr lang="en-US" dirty="0">
+                <a:sym typeface="Wingdings" pitchFamily="2" charset="2"/>
+              </a:rPr>
+              <a:t> interaction</a:t>
+            </a:r>
+            <a:endParaRPr lang="en-US" dirty="0"/>
+          </a:p>
+        </p:txBody>
+      </p:sp>
+      <p:sp>
+        <p:nvSpPr>
+          <p:cNvPr id="4" name="Footer Placeholder 3">
+            <a:extLst>
+              <a:ext uri="{FF2B5EF4-FFF2-40B4-BE49-F238E27FC236}">
+                <a16:creationId xmlns:a16="http://schemas.microsoft.com/office/drawing/2014/main" id="{E804E395-6065-D44D-94F0-3B42C6F72F8B}"/>
+              </a:ext>
+            </a:extLst>
+          </p:cNvPr>
+          <p:cNvSpPr>
+            <a:spLocks noGrp="1"/>
+          </p:cNvSpPr>
+          <p:nvPr>
+            <p:ph type="ftr" sz="quarter" idx="11"/>
+          </p:nvPr>
+        </p:nvSpPr>
+        <p:spPr/>
+        <p:txBody>
+          <a:bodyPr/>
+          <a:lstStyle/>
+          <a:p>
+            <a:r>
+              <a:rPr lang="en-US"/>
+              <a:t>W3C Web of Things (WoT) WG/IG</a:t>
+            </a:r>
+          </a:p>
+        </p:txBody>
+      </p:sp>
+      <p:sp>
+        <p:nvSpPr>
+          <p:cNvPr id="5" name="Slide Number Placeholder 4">
+            <a:extLst>
+              <a:ext uri="{FF2B5EF4-FFF2-40B4-BE49-F238E27FC236}">
+                <a16:creationId xmlns:a16="http://schemas.microsoft.com/office/drawing/2014/main" id="{6BA28903-C266-9344-9A91-A65E14F984A4}"/>
+              </a:ext>
+            </a:extLst>
+          </p:cNvPr>
+          <p:cNvSpPr>
+            <a:spLocks noGrp="1"/>
+          </p:cNvSpPr>
+          <p:nvPr>
+            <p:ph type="sldNum" sz="quarter" idx="12"/>
+          </p:nvPr>
+        </p:nvSpPr>
+        <p:spPr/>
+        <p:txBody>
+          <a:bodyPr/>
+          <a:lstStyle/>
+          <a:p>
+            <a:fld id="{055BDE2E-7167-1944-9FEE-E44668D91CB6}" type="slidenum">
+              <a:rPr lang="en-US" smtClean="0"/>
+              <a:t>7</a:t>
+            </a:fld>
+            <a:endParaRPr lang="en-US"/>
+          </a:p>
+        </p:txBody>
+      </p:sp>
+      <p:sp>
+        <p:nvSpPr>
+          <p:cNvPr id="6" name="Date Placeholder 5">
+            <a:extLst>
+              <a:ext uri="{FF2B5EF4-FFF2-40B4-BE49-F238E27FC236}">
+                <a16:creationId xmlns:a16="http://schemas.microsoft.com/office/drawing/2014/main" id="{E6EEF289-09F3-C54D-85BD-BDEBD6276A36}"/>
+              </a:ext>
+            </a:extLst>
+          </p:cNvPr>
+          <p:cNvSpPr>
+            <a:spLocks noGrp="1"/>
+          </p:cNvSpPr>
+          <p:nvPr>
+            <p:ph type="dt" sz="half" idx="10"/>
+          </p:nvPr>
+        </p:nvSpPr>
+        <p:spPr/>
+        <p:txBody>
+          <a:bodyPr/>
+          <a:lstStyle/>
+          <a:p>
+            <a:fld id="{B929AB1E-7FD9-0A40-B7C0-508CCACB3E9A}" type="datetime1">
+              <a:rPr lang="en-CA" smtClean="0"/>
+              <a:t>2021-06-23</a:t>
+            </a:fld>
+            <a:endParaRPr lang="en-US"/>
+          </a:p>
+        </p:txBody>
+      </p:sp>
+    </p:spTree>
+    <p:extLst>
+      <p:ext uri="{BB962C8B-B14F-4D97-AF65-F5344CB8AC3E}">
+        <p14:creationId xmlns:p14="http://schemas.microsoft.com/office/powerpoint/2010/main" val="3218203931"/>
+      </p:ext>
+    </p:extLst>
+  </p:cSld>
+  <p:clrMapOvr>
+    <a:masterClrMapping/>
+  </p:clrMapOvr>
+</p:sld>
+</file>
+
+<file path=ppt/slides/slide8.xml><?xml version="1.0" encoding="utf-8"?>
+<p:sld xmlns:a="http://schemas.openxmlformats.org/drawingml/2006/main" xmlns:r="http://schemas.openxmlformats.org/officeDocument/2006/relationships" xmlns:p="http://schemas.openxmlformats.org/presentationml/2006/main">
+  <p:cSld>
+    <p:spTree>
+      <p:nvGrpSpPr>
+        <p:cNvPr id="1" name=""/>
+        <p:cNvGrpSpPr/>
+        <p:nvPr/>
+      </p:nvGrpSpPr>
+      <p:grpSpPr>
+        <a:xfrm>
+          <a:off x="0" y="0"/>
+          <a:ext cx="0" cy="0"/>
+          <a:chOff x="0" y="0"/>
+          <a:chExt cx="0" cy="0"/>
+        </a:xfrm>
+      </p:grpSpPr>
+      <p:sp>
+        <p:nvSpPr>
+          <p:cNvPr id="2" name="Title 1">
+            <a:extLst>
+              <a:ext uri="{FF2B5EF4-FFF2-40B4-BE49-F238E27FC236}">
+                <a16:creationId xmlns:a16="http://schemas.microsoft.com/office/drawing/2014/main" id="{CC8B4495-3EFE-1241-88E2-3563BE487100}"/>
+              </a:ext>
+            </a:extLst>
+          </p:cNvPr>
+          <p:cNvSpPr>
+            <a:spLocks noGrp="1"/>
+          </p:cNvSpPr>
+          <p:nvPr>
+            <p:ph type="title"/>
+          </p:nvPr>
+        </p:nvSpPr>
+        <p:spPr/>
+        <p:txBody>
+          <a:bodyPr/>
+          <a:lstStyle/>
+          <a:p>
+            <a:r>
+              <a:rPr lang="en-US" dirty="0"/>
+              <a:t>Implementation and Testing Gaps</a:t>
+            </a:r>
+          </a:p>
+        </p:txBody>
+      </p:sp>
+      <p:sp>
+        <p:nvSpPr>
+          <p:cNvPr id="3" name="Content Placeholder 2">
+            <a:extLst>
+              <a:ext uri="{FF2B5EF4-FFF2-40B4-BE49-F238E27FC236}">
+                <a16:creationId xmlns:a16="http://schemas.microsoft.com/office/drawing/2014/main" id="{0C36118C-76C4-D34B-B76C-54D65E894FF3}"/>
+              </a:ext>
+            </a:extLst>
+          </p:cNvPr>
+          <p:cNvSpPr>
+            <a:spLocks noGrp="1"/>
+          </p:cNvSpPr>
+          <p:nvPr>
+            <p:ph idx="1"/>
+          </p:nvPr>
+        </p:nvSpPr>
+        <p:spPr>
+          <a:xfrm>
+            <a:off x="838200" y="1140178"/>
+            <a:ext cx="10515600" cy="5036785"/>
+          </a:xfrm>
+        </p:spPr>
+        <p:txBody>
+          <a:bodyPr/>
+          <a:lstStyle/>
+          <a:p>
+            <a:r>
+              <a:rPr lang="en-US" dirty="0"/>
+              <a:t>Elements that Need Testing</a:t>
+            </a:r>
+          </a:p>
+          <a:p>
+            <a:pPr lvl="1"/>
+            <a:r>
+              <a:rPr lang="en-US" dirty="0"/>
+              <a:t>Introductions: DNS-SD, DID, </a:t>
+            </a:r>
+            <a:r>
+              <a:rPr lang="en-US" dirty="0" err="1"/>
+              <a:t>CoRE</a:t>
+            </a:r>
+            <a:r>
+              <a:rPr lang="en-US" dirty="0"/>
+              <a:t> RD</a:t>
+            </a:r>
+          </a:p>
+          <a:p>
+            <a:pPr lvl="1"/>
+            <a:r>
+              <a:rPr lang="en-US" dirty="0"/>
+              <a:t>Explorations</a:t>
+            </a:r>
+          </a:p>
+          <a:p>
+            <a:pPr lvl="2"/>
+            <a:r>
+              <a:rPr lang="en-US" dirty="0"/>
+              <a:t>Self-Description</a:t>
+            </a:r>
+          </a:p>
+          <a:p>
+            <a:pPr lvl="2"/>
+            <a:r>
+              <a:rPr lang="en-US" dirty="0"/>
+              <a:t>Directory Service</a:t>
+            </a:r>
+          </a:p>
+          <a:p>
+            <a:r>
+              <a:rPr lang="en-US" dirty="0"/>
+              <a:t>Directory Service</a:t>
+            </a:r>
+          </a:p>
+          <a:p>
+            <a:pPr lvl="1"/>
+            <a:r>
+              <a:rPr lang="en-US" dirty="0"/>
+              <a:t>Largest part of the specification</a:t>
+            </a:r>
+          </a:p>
+          <a:p>
+            <a:pPr lvl="1"/>
+            <a:r>
+              <a:rPr lang="en-US" dirty="0"/>
+              <a:t>Two separate implementations in progress</a:t>
+            </a:r>
+          </a:p>
+          <a:p>
+            <a:pPr lvl="1"/>
+            <a:r>
+              <a:rPr lang="en-US" dirty="0"/>
+              <a:t>Start on a test suite, tool integration</a:t>
+            </a:r>
+          </a:p>
+          <a:p>
+            <a:pPr lvl="1"/>
+            <a:r>
+              <a:rPr lang="en-US" dirty="0"/>
+              <a:t>Gaps/challenges:</a:t>
+            </a:r>
+          </a:p>
+          <a:p>
+            <a:pPr lvl="2"/>
+            <a:r>
+              <a:rPr lang="en-US" dirty="0"/>
+              <a:t>Only one committed to (the optional...) SPARQL implementation</a:t>
+            </a:r>
+          </a:p>
+          <a:p>
+            <a:pPr lvl="2"/>
+            <a:r>
+              <a:rPr lang="en-US" dirty="0"/>
+              <a:t>Query mechanisms (e.g. JSON Path) very "large" – how to validate?</a:t>
+            </a:r>
+          </a:p>
+          <a:p>
+            <a:pPr lvl="2"/>
+            <a:r>
+              <a:rPr lang="en-US" dirty="0"/>
+              <a:t>JSON Path specification still in draft (with IETF)</a:t>
+            </a:r>
+          </a:p>
+          <a:p>
+            <a:pPr lvl="1"/>
+            <a:endParaRPr lang="en-US" dirty="0"/>
+          </a:p>
+        </p:txBody>
+      </p:sp>
+      <p:sp>
+        <p:nvSpPr>
+          <p:cNvPr id="4" name="Footer Placeholder 3">
+            <a:extLst>
+              <a:ext uri="{FF2B5EF4-FFF2-40B4-BE49-F238E27FC236}">
+                <a16:creationId xmlns:a16="http://schemas.microsoft.com/office/drawing/2014/main" id="{2B1133AD-AB37-7F4D-BF26-CAB33FFCF377}"/>
+              </a:ext>
+            </a:extLst>
+          </p:cNvPr>
+          <p:cNvSpPr>
+            <a:spLocks noGrp="1"/>
+          </p:cNvSpPr>
+          <p:nvPr>
+            <p:ph type="ftr" sz="quarter" idx="11"/>
+          </p:nvPr>
+        </p:nvSpPr>
+        <p:spPr/>
+        <p:txBody>
+          <a:bodyPr/>
+          <a:lstStyle/>
+          <a:p>
+            <a:r>
+              <a:rPr lang="en-US"/>
+              <a:t>W3C Web of Things (WoT) WG/IG</a:t>
+            </a:r>
+          </a:p>
+        </p:txBody>
+      </p:sp>
+      <p:sp>
+        <p:nvSpPr>
+          <p:cNvPr id="5" name="Slide Number Placeholder 4">
+            <a:extLst>
+              <a:ext uri="{FF2B5EF4-FFF2-40B4-BE49-F238E27FC236}">
+                <a16:creationId xmlns:a16="http://schemas.microsoft.com/office/drawing/2014/main" id="{3A1FA4E0-3836-C544-8AD9-35975EA62884}"/>
+              </a:ext>
+            </a:extLst>
+          </p:cNvPr>
+          <p:cNvSpPr>
+            <a:spLocks noGrp="1"/>
+          </p:cNvSpPr>
+          <p:nvPr>
+            <p:ph type="sldNum" sz="quarter" idx="12"/>
+          </p:nvPr>
+        </p:nvSpPr>
+        <p:spPr/>
+        <p:txBody>
+          <a:bodyPr/>
+          <a:lstStyle/>
+          <a:p>
+            <a:fld id="{055BDE2E-7167-1944-9FEE-E44668D91CB6}" type="slidenum">
+              <a:rPr lang="en-US" smtClean="0"/>
+              <a:t>8</a:t>
             </a:fld>
             <a:endParaRPr lang="en-US"/>
           </a:p>

</xml_diff>